<commit_message>
Update powerpoint slides generation
</commit_message>
<xml_diff>
--- a/slides/github-copilot-workshop.pptx
+++ b/slides/github-copilot-workshop.pptx
@@ -3744,7 +3744,7 @@
         </p:nvSpPr>
         <p:spPr/>
         <p:txBody>
-          <a:bodyPr wrap="square" lIns="137160" rIns="137160">
+          <a:bodyPr wrap="square">
             <a:normAutofit/>
           </a:bodyPr>
           <a:lstStyle/>
@@ -3802,7 +3802,7 @@
         </p:nvSpPr>
         <p:spPr/>
         <p:txBody>
-          <a:bodyPr wrap="square" lIns="137160" rIns="137160">
+          <a:bodyPr wrap="square">
             <a:normAutofit/>
           </a:bodyPr>
           <a:lstStyle/>
@@ -3825,7 +3825,7 @@
         </p:nvSpPr>
         <p:spPr/>
         <p:txBody>
-          <a:bodyPr wrap="square" lIns="137160" rIns="137160">
+          <a:bodyPr wrap="square">
             <a:normAutofit/>
           </a:bodyPr>
           <a:lstStyle/>
@@ -3885,7 +3885,7 @@
         </p:nvSpPr>
         <p:spPr/>
         <p:txBody>
-          <a:bodyPr wrap="square" lIns="137160" rIns="137160">
+          <a:bodyPr wrap="square">
             <a:normAutofit/>
           </a:bodyPr>
           <a:lstStyle/>
@@ -3904,8 +3904,8 @@
         </p:nvSpPr>
         <p:spPr>
           <a:xfrm>
-            <a:off x="457200" y="1188720"/>
-            <a:ext cx="11277295" cy="5212080"/>
+            <a:off x="457188" y="1165860"/>
+            <a:ext cx="11277317" cy="5232654"/>
           </a:xfrm>
           <a:prstGeom prst="rect">
             <a:avLst/>
@@ -3913,7 +3913,7 @@
           <a:noFill/>
         </p:spPr>
         <p:txBody>
-          <a:bodyPr wrap="square" lIns="137160" rIns="137160">
+          <a:bodyPr wrap="square">
             <a:normAutofit/>
           </a:bodyPr>
           <a:lstStyle/>
@@ -3992,7 +3992,7 @@
         </p:nvSpPr>
         <p:spPr/>
         <p:txBody>
-          <a:bodyPr wrap="square" lIns="137160" rIns="137160">
+          <a:bodyPr wrap="square">
             <a:normAutofit/>
           </a:bodyPr>
           <a:lstStyle/>
@@ -4015,7 +4015,7 @@
         </p:nvSpPr>
         <p:spPr/>
         <p:txBody>
-          <a:bodyPr wrap="square" lIns="137160" rIns="137160">
+          <a:bodyPr wrap="square">
             <a:normAutofit/>
           </a:bodyPr>
           <a:lstStyle/>
@@ -4106,8 +4106,8 @@
         </p:blipFill>
         <p:spPr>
           <a:xfrm>
-            <a:off x="2762997" y="1188720"/>
-            <a:ext cx="6665700" cy="5212080"/>
+            <a:off x="2749840" y="1165860"/>
+            <a:ext cx="6692012" cy="5232654"/>
           </a:xfrm>
           <a:prstGeom prst="rect">
             <a:avLst/>
@@ -4144,7 +4144,7 @@
         </p:nvSpPr>
         <p:spPr/>
         <p:txBody>
-          <a:bodyPr wrap="square" lIns="137160" rIns="137160">
+          <a:bodyPr wrap="square">
             <a:normAutofit/>
           </a:bodyPr>
           <a:lstStyle/>
@@ -4167,7 +4167,7 @@
         </p:nvSpPr>
         <p:spPr/>
         <p:txBody>
-          <a:bodyPr wrap="square" lIns="137160" rIns="137160">
+          <a:bodyPr wrap="square">
             <a:normAutofit/>
           </a:bodyPr>
           <a:lstStyle/>
@@ -4258,8 +4258,8 @@
         </p:blipFill>
         <p:spPr>
           <a:xfrm>
-            <a:off x="1697468" y="1188720"/>
-            <a:ext cx="8796759" cy="5212080"/>
+            <a:off x="1680105" y="1165860"/>
+            <a:ext cx="8831483" cy="5232654"/>
           </a:xfrm>
           <a:prstGeom prst="rect">
             <a:avLst/>
@@ -4296,7 +4296,7 @@
         </p:nvSpPr>
         <p:spPr/>
         <p:txBody>
-          <a:bodyPr wrap="square" lIns="137160" rIns="137160">
+          <a:bodyPr wrap="square">
             <a:normAutofit/>
           </a:bodyPr>
           <a:lstStyle/>
@@ -4319,7 +4319,7 @@
         </p:nvSpPr>
         <p:spPr/>
         <p:txBody>
-          <a:bodyPr wrap="square" lIns="137160" rIns="137160">
+          <a:bodyPr wrap="square">
             <a:normAutofit/>
           </a:bodyPr>
           <a:lstStyle/>
@@ -4379,7 +4379,7 @@
         </p:nvSpPr>
         <p:spPr/>
         <p:txBody>
-          <a:bodyPr wrap="square" lIns="137160" rIns="137160">
+          <a:bodyPr wrap="square">
             <a:normAutofit/>
           </a:bodyPr>
           <a:lstStyle/>
@@ -4398,8 +4398,8 @@
         </p:nvSpPr>
         <p:spPr>
           <a:xfrm>
-            <a:off x="457200" y="1188720"/>
-            <a:ext cx="11277295" cy="5212080"/>
+            <a:off x="457188" y="1165860"/>
+            <a:ext cx="11277317" cy="5232654"/>
           </a:xfrm>
           <a:prstGeom prst="rect">
             <a:avLst/>
@@ -4407,7 +4407,7 @@
           <a:noFill/>
         </p:spPr>
         <p:txBody>
-          <a:bodyPr wrap="square" lIns="137160" rIns="137160">
+          <a:bodyPr wrap="square">
             <a:normAutofit/>
           </a:bodyPr>
           <a:lstStyle/>
@@ -4486,7 +4486,7 @@
         </p:nvSpPr>
         <p:spPr/>
         <p:txBody>
-          <a:bodyPr wrap="square" lIns="137160" rIns="137160">
+          <a:bodyPr wrap="square">
             <a:normAutofit/>
           </a:bodyPr>
           <a:lstStyle/>
@@ -4509,7 +4509,7 @@
         </p:nvSpPr>
         <p:spPr/>
         <p:txBody>
-          <a:bodyPr wrap="square" lIns="137160" rIns="137160">
+          <a:bodyPr wrap="square">
             <a:normAutofit/>
           </a:bodyPr>
           <a:lstStyle/>
@@ -4594,8 +4594,8 @@
         </p:blipFill>
         <p:spPr>
           <a:xfrm>
-            <a:off x="733287" y="1188720"/>
-            <a:ext cx="10725120" cy="5212080"/>
+            <a:off x="712118" y="1165860"/>
+            <a:ext cx="10767456" cy="5232654"/>
           </a:xfrm>
           <a:prstGeom prst="rect">
             <a:avLst/>
@@ -4632,7 +4632,7 @@
         </p:nvSpPr>
         <p:spPr/>
         <p:txBody>
-          <a:bodyPr wrap="square" lIns="137160" rIns="137160">
+          <a:bodyPr wrap="square">
             <a:normAutofit/>
           </a:bodyPr>
           <a:lstStyle/>
@@ -4655,7 +4655,7 @@
         </p:nvSpPr>
         <p:spPr/>
         <p:txBody>
-          <a:bodyPr wrap="square" lIns="137160" rIns="137160">
+          <a:bodyPr wrap="square">
             <a:normAutofit/>
           </a:bodyPr>
           <a:lstStyle/>
@@ -4697,7 +4697,7 @@
         </p:nvSpPr>
         <p:spPr/>
         <p:txBody>
-          <a:bodyPr wrap="square" lIns="137160" rIns="137160">
+          <a:bodyPr wrap="square">
             <a:normAutofit/>
           </a:bodyPr>
           <a:lstStyle/>
@@ -4720,7 +4720,7 @@
         </p:nvSpPr>
         <p:spPr/>
         <p:txBody>
-          <a:bodyPr wrap="square" lIns="137160" rIns="137160">
+          <a:bodyPr wrap="square">
             <a:normAutofit/>
           </a:bodyPr>
           <a:lstStyle/>
@@ -4805,8 +4805,8 @@
         </p:blipFill>
         <p:spPr>
           <a:xfrm>
-            <a:off x="1926183" y="1188720"/>
-            <a:ext cx="8339328" cy="5212080"/>
+            <a:off x="1909723" y="1165860"/>
+            <a:ext cx="8372246" cy="5232654"/>
           </a:xfrm>
           <a:prstGeom prst="rect">
             <a:avLst/>
@@ -4868,8 +4868,8 @@
         </p:blipFill>
         <p:spPr>
           <a:xfrm>
-            <a:off x="457200" y="1962200"/>
-            <a:ext cx="11277295" cy="3665120"/>
+            <a:off x="457188" y="1949623"/>
+            <a:ext cx="11277317" cy="3665128"/>
           </a:xfrm>
           <a:prstGeom prst="rect">
             <a:avLst/>
@@ -4931,8 +4931,8 @@
         </p:blipFill>
         <p:spPr>
           <a:xfrm>
-            <a:off x="3956827" y="1188720"/>
-            <a:ext cx="4278041" cy="5212080"/>
+            <a:off x="3948382" y="1165860"/>
+            <a:ext cx="4294928" cy="5232654"/>
           </a:xfrm>
           <a:prstGeom prst="rect">
             <a:avLst/>
@@ -4969,7 +4969,7 @@
         </p:nvSpPr>
         <p:spPr/>
         <p:txBody>
-          <a:bodyPr wrap="square" lIns="137160" rIns="137160">
+          <a:bodyPr wrap="square">
             <a:normAutofit/>
           </a:bodyPr>
           <a:lstStyle/>
@@ -4992,7 +4992,7 @@
         </p:nvSpPr>
         <p:spPr/>
         <p:txBody>
-          <a:bodyPr wrap="square" lIns="137160" rIns="137160">
+          <a:bodyPr wrap="square">
             <a:normAutofit/>
           </a:bodyPr>
           <a:lstStyle/>
@@ -5083,8 +5083,8 @@
         </p:blipFill>
         <p:spPr>
           <a:xfrm>
-            <a:off x="1975047" y="1188720"/>
-            <a:ext cx="8241601" cy="5212080"/>
+            <a:off x="1958779" y="1165860"/>
+            <a:ext cx="8274134" cy="5232654"/>
           </a:xfrm>
           <a:prstGeom prst="rect">
             <a:avLst/>
@@ -5146,8 +5146,8 @@
         </p:blipFill>
         <p:spPr>
           <a:xfrm>
-            <a:off x="2318978" y="1188720"/>
-            <a:ext cx="7553739" cy="5212080"/>
+            <a:off x="2304068" y="1165860"/>
+            <a:ext cx="7583556" cy="5232654"/>
           </a:xfrm>
           <a:prstGeom prst="rect">
             <a:avLst/>
@@ -5209,8 +5209,8 @@
         </p:blipFill>
         <p:spPr>
           <a:xfrm>
-            <a:off x="457200" y="1743702"/>
-            <a:ext cx="11277295" cy="4102116"/>
+            <a:off x="457188" y="1731125"/>
+            <a:ext cx="11277317" cy="4102124"/>
           </a:xfrm>
           <a:prstGeom prst="rect">
             <a:avLst/>
@@ -5247,7 +5247,7 @@
         </p:nvSpPr>
         <p:spPr/>
         <p:txBody>
-          <a:bodyPr wrap="square" lIns="137160" rIns="137160">
+          <a:bodyPr wrap="square">
             <a:normAutofit/>
           </a:bodyPr>
           <a:lstStyle/>
@@ -5270,7 +5270,7 @@
         </p:nvSpPr>
         <p:spPr/>
         <p:txBody>
-          <a:bodyPr wrap="square" lIns="137160" rIns="137160">
+          <a:bodyPr wrap="square">
             <a:normAutofit/>
           </a:bodyPr>
           <a:lstStyle/>
@@ -5336,7 +5336,7 @@
         </p:nvSpPr>
         <p:spPr/>
         <p:txBody>
-          <a:bodyPr wrap="square" lIns="137160" rIns="137160">
+          <a:bodyPr wrap="square">
             <a:normAutofit/>
           </a:bodyPr>
           <a:lstStyle/>
@@ -5359,7 +5359,7 @@
         </p:nvSpPr>
         <p:spPr/>
         <p:txBody>
-          <a:bodyPr wrap="square" lIns="137160" rIns="137160">
+          <a:bodyPr wrap="square">
             <a:normAutofit/>
           </a:bodyPr>
           <a:lstStyle/>
@@ -5419,7 +5419,7 @@
         </p:nvSpPr>
         <p:spPr/>
         <p:txBody>
-          <a:bodyPr wrap="square" lIns="137160" rIns="137160">
+          <a:bodyPr wrap="square">
             <a:normAutofit/>
           </a:bodyPr>
           <a:lstStyle/>
@@ -5442,7 +5442,7 @@
         </p:nvSpPr>
         <p:spPr/>
         <p:txBody>
-          <a:bodyPr wrap="square" lIns="137160" rIns="137160">
+          <a:bodyPr wrap="square">
             <a:normAutofit/>
           </a:bodyPr>
           <a:lstStyle/>
@@ -5563,8 +5563,8 @@
         </p:blipFill>
         <p:spPr>
           <a:xfrm>
-            <a:off x="2927410" y="1188720"/>
-            <a:ext cx="6336875" cy="5212080"/>
+            <a:off x="2914902" y="1165860"/>
+            <a:ext cx="6361889" cy="5232654"/>
           </a:xfrm>
           <a:prstGeom prst="rect">
             <a:avLst/>
@@ -5601,7 +5601,7 @@
         </p:nvSpPr>
         <p:spPr/>
         <p:txBody>
-          <a:bodyPr wrap="square" lIns="137160" rIns="137160">
+          <a:bodyPr wrap="square">
             <a:normAutofit/>
           </a:bodyPr>
           <a:lstStyle/>
@@ -5624,7 +5624,7 @@
         </p:nvSpPr>
         <p:spPr/>
         <p:txBody>
-          <a:bodyPr wrap="square" lIns="137160" rIns="137160">
+          <a:bodyPr wrap="square">
             <a:normAutofit/>
           </a:bodyPr>
           <a:lstStyle/>
@@ -5732,7 +5732,7 @@
         </p:nvSpPr>
         <p:spPr/>
         <p:txBody>
-          <a:bodyPr wrap="square" lIns="137160" rIns="137160">
+          <a:bodyPr wrap="square">
             <a:normAutofit/>
           </a:bodyPr>
           <a:lstStyle/>
@@ -5755,7 +5755,7 @@
         </p:nvSpPr>
         <p:spPr/>
         <p:txBody>
-          <a:bodyPr wrap="square" lIns="137160" rIns="137160">
+          <a:bodyPr wrap="square">
             <a:normAutofit/>
           </a:bodyPr>
           <a:lstStyle/>
@@ -5809,7 +5809,7 @@
         </p:nvSpPr>
         <p:spPr/>
         <p:txBody>
-          <a:bodyPr wrap="square" lIns="137160" rIns="137160">
+          <a:bodyPr wrap="square">
             <a:normAutofit/>
           </a:bodyPr>
           <a:lstStyle/>
@@ -5828,8 +5828,8 @@
         </p:nvSpPr>
         <p:spPr>
           <a:xfrm>
-            <a:off x="457200" y="1188720"/>
-            <a:ext cx="11277295" cy="5212080"/>
+            <a:off x="457188" y="1165860"/>
+            <a:ext cx="11277317" cy="5232654"/>
           </a:xfrm>
           <a:prstGeom prst="rect">
             <a:avLst/>
@@ -5837,7 +5837,7 @@
           <a:noFill/>
         </p:spPr>
         <p:txBody>
-          <a:bodyPr wrap="square" lIns="137160" rIns="137160">
+          <a:bodyPr wrap="square">
             <a:normAutofit/>
           </a:bodyPr>
           <a:lstStyle/>
@@ -5906,8 +5906,8 @@
         </p:blipFill>
         <p:spPr>
           <a:xfrm>
-            <a:off x="4892726" y="1188720"/>
-            <a:ext cx="2406243" cy="5212080"/>
+            <a:off x="4887976" y="1165860"/>
+            <a:ext cx="2415741" cy="5232654"/>
           </a:xfrm>
           <a:prstGeom prst="rect">
             <a:avLst/>
@@ -5944,7 +5944,7 @@
         </p:nvSpPr>
         <p:spPr/>
         <p:txBody>
-          <a:bodyPr wrap="square" lIns="137160" rIns="137160">
+          <a:bodyPr wrap="square">
             <a:normAutofit/>
           </a:bodyPr>
           <a:lstStyle/>
@@ -5967,7 +5967,7 @@
         </p:nvSpPr>
         <p:spPr/>
         <p:txBody>
-          <a:bodyPr wrap="square" lIns="137160" rIns="137160">
+          <a:bodyPr wrap="square">
             <a:normAutofit/>
           </a:bodyPr>
           <a:lstStyle/>
@@ -6021,7 +6021,7 @@
         </p:nvSpPr>
         <p:spPr/>
         <p:txBody>
-          <a:bodyPr wrap="square" lIns="137160" rIns="137160">
+          <a:bodyPr wrap="square">
             <a:normAutofit/>
           </a:bodyPr>
           <a:lstStyle/>
@@ -6040,8 +6040,8 @@
         </p:nvSpPr>
         <p:spPr>
           <a:xfrm>
-            <a:off x="457200" y="1188720"/>
-            <a:ext cx="11277295" cy="5212080"/>
+            <a:off x="457188" y="1165860"/>
+            <a:ext cx="11277317" cy="5232654"/>
           </a:xfrm>
           <a:prstGeom prst="rect">
             <a:avLst/>
@@ -6049,7 +6049,7 @@
           <a:noFill/>
         </p:spPr>
         <p:txBody>
-          <a:bodyPr wrap="square" lIns="137160" rIns="137160">
+          <a:bodyPr wrap="square">
             <a:normAutofit/>
           </a:bodyPr>
           <a:lstStyle/>
@@ -6118,8 +6118,8 @@
         </p:blipFill>
         <p:spPr>
           <a:xfrm>
-            <a:off x="3988213" y="1188720"/>
-            <a:ext cx="4215269" cy="5212080"/>
+            <a:off x="3979892" y="1165860"/>
+            <a:ext cx="4231908" cy="5232654"/>
           </a:xfrm>
           <a:prstGeom prst="rect">
             <a:avLst/>
@@ -6156,7 +6156,7 @@
         </p:nvSpPr>
         <p:spPr/>
         <p:txBody>
-          <a:bodyPr wrap="square" lIns="137160" rIns="137160">
+          <a:bodyPr wrap="square">
             <a:normAutofit/>
           </a:bodyPr>
           <a:lstStyle/>
@@ -6179,7 +6179,7 @@
         </p:nvSpPr>
         <p:spPr/>
         <p:txBody>
-          <a:bodyPr wrap="square" lIns="137160" rIns="137160">
+          <a:bodyPr wrap="square">
             <a:normAutofit/>
           </a:bodyPr>
           <a:lstStyle/>
@@ -6227,7 +6227,7 @@
         </p:nvSpPr>
         <p:spPr/>
         <p:txBody>
-          <a:bodyPr wrap="square" lIns="137160" rIns="137160">
+          <a:bodyPr wrap="square">
             <a:normAutofit/>
           </a:bodyPr>
           <a:lstStyle/>
@@ -6246,8 +6246,8 @@
         </p:nvSpPr>
         <p:spPr>
           <a:xfrm>
-            <a:off x="457200" y="1188720"/>
-            <a:ext cx="11277295" cy="5212080"/>
+            <a:off x="457188" y="1165860"/>
+            <a:ext cx="11277317" cy="5232654"/>
           </a:xfrm>
           <a:prstGeom prst="rect">
             <a:avLst/>
@@ -6255,7 +6255,7 @@
           <a:noFill/>
         </p:spPr>
         <p:txBody>
-          <a:bodyPr wrap="square" lIns="137160" rIns="137160">
+          <a:bodyPr wrap="square">
             <a:normAutofit/>
           </a:bodyPr>
           <a:lstStyle/>
@@ -6299,7 +6299,7 @@
         </p:nvSpPr>
         <p:spPr/>
         <p:txBody>
-          <a:bodyPr wrap="square" lIns="137160" rIns="137160">
+          <a:bodyPr wrap="square">
             <a:normAutofit/>
           </a:bodyPr>
           <a:lstStyle/>
@@ -6322,7 +6322,7 @@
         </p:nvSpPr>
         <p:spPr/>
         <p:txBody>
-          <a:bodyPr wrap="square" lIns="137160" rIns="137160">
+          <a:bodyPr wrap="square">
             <a:normAutofit/>
           </a:bodyPr>
           <a:lstStyle/>
@@ -6388,7 +6388,7 @@
         </p:nvSpPr>
         <p:spPr/>
         <p:txBody>
-          <a:bodyPr wrap="square" lIns="137160" rIns="137160">
+          <a:bodyPr wrap="square">
             <a:normAutofit/>
           </a:bodyPr>
           <a:lstStyle/>
@@ -6411,7 +6411,7 @@
         </p:nvSpPr>
         <p:spPr/>
         <p:txBody>
-          <a:bodyPr wrap="square" lIns="137160" rIns="137160">
+          <a:bodyPr wrap="square">
             <a:normAutofit/>
           </a:bodyPr>
           <a:lstStyle/>
@@ -6459,7 +6459,7 @@
         </p:nvSpPr>
         <p:spPr/>
         <p:txBody>
-          <a:bodyPr wrap="square" lIns="137160" rIns="137160">
+          <a:bodyPr wrap="square">
             <a:normAutofit/>
           </a:bodyPr>
           <a:lstStyle/>
@@ -6478,8 +6478,8 @@
         </p:nvSpPr>
         <p:spPr>
           <a:xfrm>
-            <a:off x="457200" y="1188720"/>
-            <a:ext cx="11277295" cy="5212080"/>
+            <a:off x="457188" y="1165860"/>
+            <a:ext cx="11277317" cy="5232654"/>
           </a:xfrm>
           <a:prstGeom prst="rect">
             <a:avLst/>
@@ -6487,7 +6487,7 @@
           <a:noFill/>
         </p:spPr>
         <p:txBody>
-          <a:bodyPr wrap="square" lIns="137160" rIns="137160">
+          <a:bodyPr wrap="square">
             <a:normAutofit/>
           </a:bodyPr>
           <a:lstStyle/>
@@ -6531,7 +6531,7 @@
         </p:nvSpPr>
         <p:spPr/>
         <p:txBody>
-          <a:bodyPr wrap="square" lIns="137160" rIns="137160">
+          <a:bodyPr wrap="square">
             <a:normAutofit/>
           </a:bodyPr>
           <a:lstStyle/>
@@ -6554,7 +6554,7 @@
         </p:nvSpPr>
         <p:spPr/>
         <p:txBody>
-          <a:bodyPr wrap="square" lIns="137160" rIns="137160">
+          <a:bodyPr wrap="square">
             <a:normAutofit/>
           </a:bodyPr>
           <a:lstStyle/>
@@ -6608,7 +6608,7 @@
         </p:nvSpPr>
         <p:spPr/>
         <p:txBody>
-          <a:bodyPr wrap="square" lIns="137160" rIns="137160">
+          <a:bodyPr wrap="square">
             <a:normAutofit/>
           </a:bodyPr>
           <a:lstStyle/>
@@ -6627,8 +6627,8 @@
         </p:nvSpPr>
         <p:spPr>
           <a:xfrm>
-            <a:off x="457200" y="1188720"/>
-            <a:ext cx="11277295" cy="5212080"/>
+            <a:off x="457188" y="1165860"/>
+            <a:ext cx="11277317" cy="5232654"/>
           </a:xfrm>
           <a:prstGeom prst="rect">
             <a:avLst/>
@@ -6636,7 +6636,7 @@
           <a:noFill/>
         </p:spPr>
         <p:txBody>
-          <a:bodyPr wrap="square" lIns="137160" rIns="137160">
+          <a:bodyPr wrap="square">
             <a:normAutofit/>
           </a:bodyPr>
           <a:lstStyle/>
@@ -6743,7 +6743,7 @@
         </p:nvSpPr>
         <p:spPr/>
         <p:txBody>
-          <a:bodyPr wrap="square" lIns="137160" rIns="137160">
+          <a:bodyPr wrap="square">
             <a:normAutofit/>
           </a:bodyPr>
           <a:lstStyle/>
@@ -6766,7 +6766,7 @@
         </p:nvSpPr>
         <p:spPr/>
         <p:txBody>
-          <a:bodyPr wrap="square" lIns="137160" rIns="137160">
+          <a:bodyPr wrap="square">
             <a:normAutofit/>
           </a:bodyPr>
           <a:lstStyle/>
@@ -6814,7 +6814,7 @@
         </p:nvSpPr>
         <p:spPr/>
         <p:txBody>
-          <a:bodyPr wrap="square" lIns="137160" rIns="137160">
+          <a:bodyPr wrap="square">
             <a:normAutofit/>
           </a:bodyPr>
           <a:lstStyle/>
@@ -6833,8 +6833,8 @@
         </p:nvSpPr>
         <p:spPr>
           <a:xfrm>
-            <a:off x="457200" y="1188720"/>
-            <a:ext cx="11277295" cy="5212080"/>
+            <a:off x="457188" y="1165860"/>
+            <a:ext cx="11277317" cy="5232654"/>
           </a:xfrm>
           <a:prstGeom prst="rect">
             <a:avLst/>
@@ -6842,7 +6842,7 @@
           <a:noFill/>
         </p:spPr>
         <p:txBody>
-          <a:bodyPr wrap="square" lIns="137160" rIns="137160">
+          <a:bodyPr wrap="square">
             <a:normAutofit/>
           </a:bodyPr>
           <a:lstStyle/>
@@ -6886,7 +6886,7 @@
         </p:nvSpPr>
         <p:spPr/>
         <p:txBody>
-          <a:bodyPr wrap="square" lIns="137160" rIns="137160">
+          <a:bodyPr wrap="square">
             <a:normAutofit/>
           </a:bodyPr>
           <a:lstStyle/>
@@ -6909,7 +6909,7 @@
         </p:nvSpPr>
         <p:spPr/>
         <p:txBody>
-          <a:bodyPr wrap="square" lIns="137160" rIns="137160">
+          <a:bodyPr wrap="square">
             <a:normAutofit/>
           </a:bodyPr>
           <a:lstStyle/>
@@ -6982,8 +6982,8 @@
         </p:blipFill>
         <p:spPr>
           <a:xfrm>
-            <a:off x="4844448" y="1188720"/>
-            <a:ext cx="2502799" cy="5212080"/>
+            <a:off x="4839507" y="1165860"/>
+            <a:ext cx="2512678" cy="5232654"/>
           </a:xfrm>
           <a:prstGeom prst="rect">
             <a:avLst/>
@@ -7045,8 +7045,8 @@
         </p:blipFill>
         <p:spPr>
           <a:xfrm>
-            <a:off x="588744" y="1188720"/>
-            <a:ext cx="11014206" cy="5212080"/>
+            <a:off x="567005" y="1165860"/>
+            <a:ext cx="11057683" cy="5232654"/>
           </a:xfrm>
           <a:prstGeom prst="rect">
             <a:avLst/>
@@ -7083,7 +7083,7 @@
         </p:nvSpPr>
         <p:spPr/>
         <p:txBody>
-          <a:bodyPr wrap="square" lIns="137160" rIns="137160">
+          <a:bodyPr wrap="square">
             <a:normAutofit/>
           </a:bodyPr>
           <a:lstStyle/>
@@ -7106,7 +7106,7 @@
         </p:nvSpPr>
         <p:spPr/>
         <p:txBody>
-          <a:bodyPr wrap="square" lIns="137160" rIns="137160">
+          <a:bodyPr wrap="square">
             <a:normAutofit/>
           </a:bodyPr>
           <a:lstStyle/>
@@ -7154,7 +7154,7 @@
         </p:nvSpPr>
         <p:spPr/>
         <p:txBody>
-          <a:bodyPr wrap="square" lIns="137160" rIns="137160">
+          <a:bodyPr wrap="square">
             <a:normAutofit/>
           </a:bodyPr>
           <a:lstStyle/>
@@ -7177,7 +7177,7 @@
         </p:nvSpPr>
         <p:spPr/>
         <p:txBody>
-          <a:bodyPr wrap="square" lIns="137160" rIns="137160">
+          <a:bodyPr wrap="square">
             <a:normAutofit/>
           </a:bodyPr>
           <a:lstStyle/>
@@ -7286,8 +7286,8 @@
         </p:blipFill>
         <p:spPr>
           <a:xfrm>
-            <a:off x="1379033" y="1188720"/>
-            <a:ext cx="9433628" cy="5212080"/>
+            <a:off x="1360413" y="1165860"/>
+            <a:ext cx="9470866" cy="5232654"/>
           </a:xfrm>
           <a:prstGeom prst="rect">
             <a:avLst/>
@@ -7324,7 +7324,7 @@
         </p:nvSpPr>
         <p:spPr/>
         <p:txBody>
-          <a:bodyPr wrap="square" lIns="137160" rIns="137160">
+          <a:bodyPr wrap="square">
             <a:normAutofit/>
           </a:bodyPr>
           <a:lstStyle/>
@@ -7347,7 +7347,7 @@
         </p:nvSpPr>
         <p:spPr/>
         <p:txBody>
-          <a:bodyPr wrap="square" lIns="137160" rIns="137160">
+          <a:bodyPr wrap="square">
             <a:normAutofit/>
           </a:bodyPr>
           <a:lstStyle/>
@@ -7395,7 +7395,7 @@
         </p:nvSpPr>
         <p:spPr/>
         <p:txBody>
-          <a:bodyPr wrap="square" lIns="137160" rIns="137160">
+          <a:bodyPr wrap="square">
             <a:normAutofit/>
           </a:bodyPr>
           <a:lstStyle/>
@@ -7418,7 +7418,7 @@
         </p:nvSpPr>
         <p:spPr/>
         <p:txBody>
-          <a:bodyPr wrap="square" lIns="137160" rIns="137160">
+          <a:bodyPr wrap="square">
             <a:normAutofit/>
           </a:bodyPr>
           <a:lstStyle/>
@@ -7497,8 +7497,8 @@
         </p:blipFill>
         <p:spPr>
           <a:xfrm>
-            <a:off x="4002643" y="1188720"/>
-            <a:ext cx="4186409" cy="5212080"/>
+            <a:off x="3994379" y="1165860"/>
+            <a:ext cx="4202934" cy="5232654"/>
           </a:xfrm>
           <a:prstGeom prst="rect">
             <a:avLst/>
@@ -7535,7 +7535,7 @@
         </p:nvSpPr>
         <p:spPr/>
         <p:txBody>
-          <a:bodyPr wrap="square" lIns="137160" rIns="137160">
+          <a:bodyPr wrap="square">
             <a:normAutofit/>
           </a:bodyPr>
           <a:lstStyle/>
@@ -7558,7 +7558,7 @@
         </p:nvSpPr>
         <p:spPr/>
         <p:txBody>
-          <a:bodyPr wrap="square" lIns="137160" rIns="137160">
+          <a:bodyPr wrap="square">
             <a:normAutofit/>
           </a:bodyPr>
           <a:lstStyle/>
@@ -7631,8 +7631,8 @@
         </p:blipFill>
         <p:spPr>
           <a:xfrm>
-            <a:off x="2828086" y="1188720"/>
-            <a:ext cx="6535523" cy="5212080"/>
+            <a:off x="2815186" y="1165860"/>
+            <a:ext cx="6561321" cy="5232654"/>
           </a:xfrm>
           <a:prstGeom prst="rect">
             <a:avLst/>
@@ -7669,7 +7669,7 @@
         </p:nvSpPr>
         <p:spPr/>
         <p:txBody>
-          <a:bodyPr wrap="square" lIns="137160" rIns="137160">
+          <a:bodyPr wrap="square">
             <a:normAutofit/>
           </a:bodyPr>
           <a:lstStyle/>
@@ -7692,7 +7692,7 @@
         </p:nvSpPr>
         <p:spPr/>
         <p:txBody>
-          <a:bodyPr wrap="square" lIns="137160" rIns="137160">
+          <a:bodyPr wrap="square">
             <a:normAutofit/>
           </a:bodyPr>
           <a:lstStyle/>
@@ -7771,8 +7771,8 @@
         </p:blipFill>
         <p:spPr>
           <a:xfrm>
-            <a:off x="2822956" y="1188720"/>
-            <a:ext cx="6545783" cy="5212080"/>
+            <a:off x="2810036" y="1165860"/>
+            <a:ext cx="6571621" cy="5232654"/>
           </a:xfrm>
           <a:prstGeom prst="rect">
             <a:avLst/>
@@ -7809,7 +7809,7 @@
         </p:nvSpPr>
         <p:spPr/>
         <p:txBody>
-          <a:bodyPr wrap="square" lIns="137160" rIns="137160">
+          <a:bodyPr wrap="square">
             <a:normAutofit/>
           </a:bodyPr>
           <a:lstStyle/>
@@ -7832,7 +7832,7 @@
         </p:nvSpPr>
         <p:spPr/>
         <p:txBody>
-          <a:bodyPr wrap="square" lIns="137160" rIns="137160">
+          <a:bodyPr wrap="square">
             <a:normAutofit/>
           </a:bodyPr>
           <a:lstStyle/>
@@ -7905,8 +7905,8 @@
         </p:blipFill>
         <p:spPr>
           <a:xfrm>
-            <a:off x="4540003" y="1188720"/>
-            <a:ext cx="3111689" cy="5212080"/>
+            <a:off x="4533860" y="1165860"/>
+            <a:ext cx="3123972" cy="5232654"/>
           </a:xfrm>
           <a:prstGeom prst="rect">
             <a:avLst/>
@@ -7943,7 +7943,7 @@
         </p:nvSpPr>
         <p:spPr/>
         <p:txBody>
-          <a:bodyPr wrap="square" lIns="137160" rIns="137160">
+          <a:bodyPr wrap="square">
             <a:normAutofit/>
           </a:bodyPr>
           <a:lstStyle/>
@@ -7966,7 +7966,7 @@
         </p:nvSpPr>
         <p:spPr/>
         <p:txBody>
-          <a:bodyPr wrap="square" lIns="137160" rIns="137160">
+          <a:bodyPr wrap="square">
             <a:normAutofit/>
           </a:bodyPr>
           <a:lstStyle/>
@@ -8044,7 +8044,7 @@
         </p:nvSpPr>
         <p:spPr/>
         <p:txBody>
-          <a:bodyPr wrap="square" lIns="137160" rIns="137160">
+          <a:bodyPr wrap="square">
             <a:normAutofit/>
           </a:bodyPr>
           <a:lstStyle/>
@@ -8067,7 +8067,7 @@
         </p:nvSpPr>
         <p:spPr/>
         <p:txBody>
-          <a:bodyPr wrap="square" lIns="137160" rIns="137160">
+          <a:bodyPr wrap="square">
             <a:normAutofit/>
           </a:bodyPr>
           <a:lstStyle/>
@@ -8151,7 +8151,7 @@
         </p:nvSpPr>
         <p:spPr/>
         <p:txBody>
-          <a:bodyPr wrap="square" lIns="137160" rIns="137160">
+          <a:bodyPr wrap="square">
             <a:normAutofit/>
           </a:bodyPr>
           <a:lstStyle/>
@@ -8174,7 +8174,7 @@
         </p:nvSpPr>
         <p:spPr/>
         <p:txBody>
-          <a:bodyPr wrap="square" lIns="137160" rIns="137160">
+          <a:bodyPr wrap="square">
             <a:normAutofit/>
           </a:bodyPr>
           <a:lstStyle/>
@@ -8234,7 +8234,7 @@
         </p:nvSpPr>
         <p:spPr/>
         <p:txBody>
-          <a:bodyPr wrap="square" lIns="137160" rIns="137160">
+          <a:bodyPr wrap="square">
             <a:normAutofit/>
           </a:bodyPr>
           <a:lstStyle/>
@@ -8257,7 +8257,7 @@
         </p:nvSpPr>
         <p:spPr/>
         <p:txBody>
-          <a:bodyPr wrap="square" lIns="137160" rIns="137160">
+          <a:bodyPr wrap="square">
             <a:normAutofit/>
           </a:bodyPr>
           <a:lstStyle/>
@@ -8317,7 +8317,7 @@
         </p:nvSpPr>
         <p:spPr/>
         <p:txBody>
-          <a:bodyPr wrap="square" lIns="137160" rIns="137160">
+          <a:bodyPr wrap="square">
             <a:normAutofit/>
           </a:bodyPr>
           <a:lstStyle/>
@@ -8340,7 +8340,7 @@
         </p:nvSpPr>
         <p:spPr/>
         <p:txBody>
-          <a:bodyPr wrap="square" lIns="137160" rIns="137160">
+          <a:bodyPr wrap="square">
             <a:normAutofit/>
           </a:bodyPr>
           <a:lstStyle/>
@@ -8394,7 +8394,7 @@
         </p:nvSpPr>
         <p:spPr/>
         <p:txBody>
-          <a:bodyPr wrap="square" lIns="137160" rIns="137160">
+          <a:bodyPr wrap="square">
             <a:normAutofit/>
           </a:bodyPr>
           <a:lstStyle/>
@@ -8417,7 +8417,7 @@
         </p:nvSpPr>
         <p:spPr/>
         <p:txBody>
-          <a:bodyPr wrap="square" lIns="137160" rIns="137160">
+          <a:bodyPr wrap="square">
             <a:normAutofit/>
           </a:bodyPr>
           <a:lstStyle/>
@@ -8471,7 +8471,7 @@
         </p:nvSpPr>
         <p:spPr/>
         <p:txBody>
-          <a:bodyPr wrap="square" lIns="137160" rIns="137160">
+          <a:bodyPr wrap="square">
             <a:normAutofit/>
           </a:bodyPr>
           <a:lstStyle/>
@@ -8494,7 +8494,7 @@
         </p:nvSpPr>
         <p:spPr/>
         <p:txBody>
-          <a:bodyPr wrap="square" lIns="137160" rIns="137160">
+          <a:bodyPr wrap="square">
             <a:normAutofit/>
           </a:bodyPr>
           <a:lstStyle/>
@@ -8548,7 +8548,7 @@
         </p:nvSpPr>
         <p:spPr/>
         <p:txBody>
-          <a:bodyPr wrap="square" lIns="137160" rIns="137160">
+          <a:bodyPr wrap="square">
             <a:normAutofit/>
           </a:bodyPr>
           <a:lstStyle/>
@@ -8571,7 +8571,7 @@
         </p:nvSpPr>
         <p:spPr/>
         <p:txBody>
-          <a:bodyPr wrap="square" lIns="137160" rIns="137160">
+          <a:bodyPr wrap="square">
             <a:normAutofit/>
           </a:bodyPr>
           <a:lstStyle/>
@@ -8625,7 +8625,7 @@
         </p:nvSpPr>
         <p:spPr/>
         <p:txBody>
-          <a:bodyPr wrap="square" lIns="137160" rIns="137160">
+          <a:bodyPr wrap="square">
             <a:normAutofit/>
           </a:bodyPr>
           <a:lstStyle/>
@@ -8648,7 +8648,7 @@
         </p:nvSpPr>
         <p:spPr/>
         <p:txBody>
-          <a:bodyPr wrap="square" lIns="137160" rIns="137160">
+          <a:bodyPr wrap="square">
             <a:normAutofit/>
           </a:bodyPr>
           <a:lstStyle/>
@@ -8702,7 +8702,7 @@
         </p:nvSpPr>
         <p:spPr/>
         <p:txBody>
-          <a:bodyPr wrap="square" lIns="137160" rIns="137160">
+          <a:bodyPr wrap="square">
             <a:normAutofit/>
           </a:bodyPr>
           <a:lstStyle/>
@@ -8725,7 +8725,7 @@
         </p:nvSpPr>
         <p:spPr/>
         <p:txBody>
-          <a:bodyPr wrap="square" lIns="137160" rIns="137160">
+          <a:bodyPr wrap="square">
             <a:normAutofit/>
           </a:bodyPr>
           <a:lstStyle/>
@@ -8779,7 +8779,7 @@
         </p:nvSpPr>
         <p:spPr/>
         <p:txBody>
-          <a:bodyPr wrap="square" lIns="137160" rIns="137160">
+          <a:bodyPr wrap="square">
             <a:normAutofit/>
           </a:bodyPr>
           <a:lstStyle/>
@@ -8802,7 +8802,7 @@
         </p:nvSpPr>
         <p:spPr/>
         <p:txBody>
-          <a:bodyPr wrap="square" lIns="137160" rIns="137160">
+          <a:bodyPr wrap="square">
             <a:normAutofit/>
           </a:bodyPr>
           <a:lstStyle/>
@@ -8862,7 +8862,7 @@
         </p:nvSpPr>
         <p:spPr/>
         <p:txBody>
-          <a:bodyPr wrap="square" lIns="137160" rIns="137160">
+          <a:bodyPr wrap="square">
             <a:normAutofit/>
           </a:bodyPr>
           <a:lstStyle/>
@@ -8885,7 +8885,7 @@
         </p:nvSpPr>
         <p:spPr/>
         <p:txBody>
-          <a:bodyPr wrap="square" lIns="137160" rIns="137160">
+          <a:bodyPr wrap="square">
             <a:normAutofit/>
           </a:bodyPr>
           <a:lstStyle/>
@@ -8939,7 +8939,7 @@
         </p:nvSpPr>
         <p:spPr/>
         <p:txBody>
-          <a:bodyPr wrap="square" lIns="137160" rIns="137160">
+          <a:bodyPr wrap="square">
             <a:normAutofit/>
           </a:bodyPr>
           <a:lstStyle/>
@@ -8962,7 +8962,7 @@
         </p:nvSpPr>
         <p:spPr/>
         <p:txBody>
-          <a:bodyPr wrap="square" lIns="137160" rIns="137160">
+          <a:bodyPr wrap="square">
             <a:normAutofit/>
           </a:bodyPr>
           <a:lstStyle/>
@@ -9053,8 +9053,8 @@
         </p:blipFill>
         <p:spPr>
           <a:xfrm>
-            <a:off x="1734274" y="1188720"/>
-            <a:ext cx="8723146" cy="5212080"/>
+            <a:off x="1717057" y="1165860"/>
+            <a:ext cx="8757579" cy="5232654"/>
           </a:xfrm>
           <a:prstGeom prst="rect">
             <a:avLst/>

</xml_diff>